<commit_message>
Close to a final draft
Bibliography needs tidying, and typesetting needs checking
</commit_message>
<xml_diff>
--- a/imagej lag sim figure/lag sim recon.pptx
+++ b/imagej lag sim figure/lag sim recon.pptx
@@ -243,7 +243,7 @@
           <a:p>
             <a:fld id="{D4DB1356-5F01-43EB-828D-BA428F19442C}" type="datetimeFigureOut">
               <a:rPr lang="en-GB" smtClean="0"/>
-              <a:t>10/12/2018</a:t>
+              <a:t>19/12/2018</a:t>
             </a:fld>
             <a:endParaRPr lang="en-GB"/>
           </a:p>
@@ -413,7 +413,7 @@
           <a:p>
             <a:fld id="{D4DB1356-5F01-43EB-828D-BA428F19442C}" type="datetimeFigureOut">
               <a:rPr lang="en-GB" smtClean="0"/>
-              <a:t>10/12/2018</a:t>
+              <a:t>19/12/2018</a:t>
             </a:fld>
             <a:endParaRPr lang="en-GB"/>
           </a:p>
@@ -593,7 +593,7 @@
           <a:p>
             <a:fld id="{D4DB1356-5F01-43EB-828D-BA428F19442C}" type="datetimeFigureOut">
               <a:rPr lang="en-GB" smtClean="0"/>
-              <a:t>10/12/2018</a:t>
+              <a:t>19/12/2018</a:t>
             </a:fld>
             <a:endParaRPr lang="en-GB"/>
           </a:p>
@@ -763,7 +763,7 @@
           <a:p>
             <a:fld id="{D4DB1356-5F01-43EB-828D-BA428F19442C}" type="datetimeFigureOut">
               <a:rPr lang="en-GB" smtClean="0"/>
-              <a:t>10/12/2018</a:t>
+              <a:t>19/12/2018</a:t>
             </a:fld>
             <a:endParaRPr lang="en-GB"/>
           </a:p>
@@ -1007,7 +1007,7 @@
           <a:p>
             <a:fld id="{D4DB1356-5F01-43EB-828D-BA428F19442C}" type="datetimeFigureOut">
               <a:rPr lang="en-GB" smtClean="0"/>
-              <a:t>10/12/2018</a:t>
+              <a:t>19/12/2018</a:t>
             </a:fld>
             <a:endParaRPr lang="en-GB"/>
           </a:p>
@@ -1239,7 +1239,7 @@
           <a:p>
             <a:fld id="{D4DB1356-5F01-43EB-828D-BA428F19442C}" type="datetimeFigureOut">
               <a:rPr lang="en-GB" smtClean="0"/>
-              <a:t>10/12/2018</a:t>
+              <a:t>19/12/2018</a:t>
             </a:fld>
             <a:endParaRPr lang="en-GB"/>
           </a:p>
@@ -1606,7 +1606,7 @@
           <a:p>
             <a:fld id="{D4DB1356-5F01-43EB-828D-BA428F19442C}" type="datetimeFigureOut">
               <a:rPr lang="en-GB" smtClean="0"/>
-              <a:t>10/12/2018</a:t>
+              <a:t>19/12/2018</a:t>
             </a:fld>
             <a:endParaRPr lang="en-GB"/>
           </a:p>
@@ -1724,7 +1724,7 @@
           <a:p>
             <a:fld id="{D4DB1356-5F01-43EB-828D-BA428F19442C}" type="datetimeFigureOut">
               <a:rPr lang="en-GB" smtClean="0"/>
-              <a:t>10/12/2018</a:t>
+              <a:t>19/12/2018</a:t>
             </a:fld>
             <a:endParaRPr lang="en-GB"/>
           </a:p>
@@ -1819,7 +1819,7 @@
           <a:p>
             <a:fld id="{D4DB1356-5F01-43EB-828D-BA428F19442C}" type="datetimeFigureOut">
               <a:rPr lang="en-GB" smtClean="0"/>
-              <a:t>10/12/2018</a:t>
+              <a:t>19/12/2018</a:t>
             </a:fld>
             <a:endParaRPr lang="en-GB"/>
           </a:p>
@@ -2096,7 +2096,7 @@
           <a:p>
             <a:fld id="{D4DB1356-5F01-43EB-828D-BA428F19442C}" type="datetimeFigureOut">
               <a:rPr lang="en-GB" smtClean="0"/>
-              <a:t>10/12/2018</a:t>
+              <a:t>19/12/2018</a:t>
             </a:fld>
             <a:endParaRPr lang="en-GB"/>
           </a:p>
@@ -2353,7 +2353,7 @@
           <a:p>
             <a:fld id="{D4DB1356-5F01-43EB-828D-BA428F19442C}" type="datetimeFigureOut">
               <a:rPr lang="en-GB" smtClean="0"/>
-              <a:t>10/12/2018</a:t>
+              <a:t>19/12/2018</a:t>
             </a:fld>
             <a:endParaRPr lang="en-GB"/>
           </a:p>
@@ -2566,7 +2566,7 @@
           <a:p>
             <a:fld id="{D4DB1356-5F01-43EB-828D-BA428F19442C}" type="datetimeFigureOut">
               <a:rPr lang="en-GB" smtClean="0"/>
-              <a:t>10/12/2018</a:t>
+              <a:t>19/12/2018</a:t>
             </a:fld>
             <a:endParaRPr lang="en-GB"/>
           </a:p>
@@ -2993,8 +2993,8 @@
         </p:blipFill>
         <p:spPr>
           <a:xfrm>
-            <a:off x="2963264" y="-15499"/>
-            <a:ext cx="3878983" cy="5661663"/>
+            <a:off x="3087249" y="-15499"/>
+            <a:ext cx="3987728" cy="5820384"/>
           </a:xfrm>
           <a:prstGeom prst="rect">
             <a:avLst/>
@@ -3015,7 +3015,7 @@
         </p:nvSpPr>
         <p:spPr>
           <a:xfrm>
-            <a:off x="2145067" y="2129151"/>
+            <a:off x="2269052" y="2129151"/>
             <a:ext cx="383438" cy="307777"/>
           </a:xfrm>
           <a:prstGeom prst="rect">
@@ -3053,7 +3053,7 @@
         </p:nvSpPr>
         <p:spPr>
           <a:xfrm>
-            <a:off x="1232385" y="5646164"/>
+            <a:off x="1356370" y="5801144"/>
             <a:ext cx="393056" cy="307777"/>
           </a:xfrm>
           <a:prstGeom prst="rect">
@@ -3091,7 +3091,7 @@
         </p:nvSpPr>
         <p:spPr>
           <a:xfrm>
-            <a:off x="4711036" y="5646164"/>
+            <a:off x="4835021" y="5801144"/>
             <a:ext cx="383438" cy="307777"/>
           </a:xfrm>
           <a:prstGeom prst="rect">
@@ -3129,16 +3129,15 @@
           </p:cNvPicPr>
           <p:nvPr/>
         </p:nvPicPr>
-        <p:blipFill>
+        <p:blipFill rotWithShape="1">
           <a:blip r:embed="rId3"/>
-          <a:stretch>
-            <a:fillRect/>
-          </a:stretch>
+          <a:srcRect l="9444"/>
+          <a:stretch/>
         </p:blipFill>
         <p:spPr>
           <a:xfrm>
-            <a:off x="-229421" y="0"/>
-            <a:ext cx="2429346" cy="2585518"/>
+            <a:off x="123984" y="0"/>
+            <a:ext cx="2199925" cy="2585518"/>
           </a:xfrm>
           <a:prstGeom prst="rect">
             <a:avLst/>
@@ -3167,7 +3166,7 @@
         </p:blipFill>
         <p:spPr>
           <a:xfrm>
-            <a:off x="12201" y="2585518"/>
+            <a:off x="123984" y="2751094"/>
             <a:ext cx="2833425" cy="3050050"/>
           </a:xfrm>
           <a:prstGeom prst="rect">

</xml_diff>